<commit_message>
Updated date on slides
</commit_message>
<xml_diff>
--- a/slides/08-28-Postulates.pptx
+++ b/slides/08-28-Postulates.pptx
@@ -3708,7 +3708,7 @@
       </p:grpSpPr>
       <p:sp>
         <p:nvSpPr>
-          <p:cNvPr id="178" name="8/24/2023"/>
+          <p:cNvPr id="178" name="8/28/2024"/>
           <p:cNvSpPr txBox="1"/>
           <p:nvPr>
             <p:ph type="title"/>
@@ -3725,7 +3725,7 @@
           <a:p>
             <a:pPr/>
             <a:r>
-              <a:t>8/24/2023</a:t>
+              <a:t>8/28/2024</a:t>
             </a:r>
           </a:p>
         </p:txBody>
@@ -8906,8 +8906,8 @@
       </p:par>
     </p:tnLst>
     <p:bldLst>
+      <p:bldP build="p" bldLvl="1" animBg="1" rev="0" advAuto="0" spid="250" grpId="1"/>
       <p:bldP build="whole" bldLvl="1" animBg="1" rev="0" advAuto="0" spid="256" grpId="2"/>
-      <p:bldP build="p" bldLvl="1" animBg="1" rev="0" advAuto="0" spid="250" grpId="1"/>
     </p:bldLst>
   </p:timing>
 </p:sld>
@@ -13745,8 +13745,8 @@
       </p:par>
     </p:tnLst>
     <p:bldLst>
+      <p:bldP build="whole" bldLvl="1" animBg="1" rev="0" advAuto="0" spid="277" grpId="2"/>
       <p:bldP build="p" bldLvl="5" animBg="1" rev="0" advAuto="0" spid="275" grpId="1"/>
-      <p:bldP build="whole" bldLvl="1" animBg="1" rev="0" advAuto="0" spid="277" grpId="2"/>
     </p:bldLst>
   </p:timing>
 </p:sld>

</xml_diff>

<commit_message>
Updates to slides and exercise 1
</commit_message>
<xml_diff>
--- a/slides/08-28-Postulates.pptx
+++ b/slides/08-28-Postulates.pptx
@@ -3751,123 +3751,87 @@
           <a:bodyPr numCol="2" spcCol="1155700"/>
           <a:lstStyle/>
           <a:p>
-            <a:pPr marL="580319" indent="-580319" defTabSz="772239">
-              <a:defRPr sz="4700"/>
-            </a:pPr>
+            <a:pPr/>
             <a:r>
               <a:t>Postulates of quantum mechanics</a:t>
             </a:r>
           </a:p>
           <a:p>
-            <a:pPr lvl="1" marL="998149" indent="-580319" defTabSz="772239">
-              <a:defRPr sz="4700"/>
-            </a:pPr>
+            <a:pPr lvl="1"/>
             <a:r>
               <a:t>States and wavefunctions</a:t>
             </a:r>
           </a:p>
           <a:p>
-            <a:pPr lvl="1" marL="998149" indent="-580319" defTabSz="772239">
-              <a:defRPr sz="4700"/>
-            </a:pPr>
+            <a:pPr lvl="1"/>
             <a:r>
               <a:t>Observables and representations</a:t>
             </a:r>
           </a:p>
           <a:p>
-            <a:pPr lvl="1" marL="998149" indent="-580319" defTabSz="772239">
-              <a:defRPr sz="4700"/>
-            </a:pPr>
+            <a:pPr lvl="1"/>
             <a:r>
               <a:t>The outcome of measurements</a:t>
             </a:r>
           </a:p>
           <a:p>
-            <a:pPr lvl="2" marL="1415979" indent="-580319" defTabSz="772239">
-              <a:defRPr sz="4700"/>
-            </a:pPr>
+            <a:pPr lvl="2"/>
             <a:r>
               <a:t>Eigenfunction expansions, including Fourier series</a:t>
             </a:r>
           </a:p>
           <a:p>
-            <a:pPr lvl="2" marL="1415979" indent="-580319" defTabSz="772239">
-              <a:defRPr sz="4700"/>
-            </a:pPr>
+            <a:pPr lvl="2"/>
             <a:r>
               <a:t>Collapse of wavefunctions and Schrödinger’s cat</a:t>
             </a:r>
           </a:p>
           <a:p>
-            <a:pPr lvl="1" marL="998149" indent="-580319" defTabSz="772239">
-              <a:defRPr sz="4700"/>
-            </a:pPr>
+            <a:pPr lvl="1"/>
             <a:r>
               <a:t>The Born interpretation: probabilities of particle positions</a:t>
             </a:r>
           </a:p>
           <a:p>
-            <a:pPr lvl="1" marL="998149" indent="-580319" defTabSz="772239">
-              <a:defRPr sz="4700"/>
-            </a:pPr>
+            <a:pPr lvl="1"/>
             <a:r>
               <a:t>The Schrödinger equation</a:t>
             </a:r>
           </a:p>
           <a:p>
-            <a:pPr lvl="2" marL="1415979" indent="-580319" defTabSz="772239">
-              <a:defRPr sz="4700"/>
-            </a:pPr>
+            <a:pPr lvl="2"/>
             <a:r>
               <a:t>The Hamiltonian operator</a:t>
             </a:r>
           </a:p>
           <a:p>
-            <a:pPr lvl="2" marL="1415979" indent="-580319" defTabSz="772239">
-              <a:defRPr sz="4700"/>
-            </a:pPr>
+            <a:pPr lvl="2"/>
             <a:r>
               <a:t>Time-independent form by separation of variables</a:t>
             </a:r>
           </a:p>
           <a:p>
-            <a:pPr lvl="2" marL="1415979" indent="-580319" defTabSz="772239">
-              <a:defRPr sz="4700"/>
-            </a:pPr>
+            <a:pPr lvl="2"/>
             <a:r>
               <a:t>Time dependence of the wavefunction</a:t>
             </a:r>
           </a:p>
           <a:p>
-            <a:pPr lvl="1" marL="998149" indent="-580319" defTabSz="772239">
-              <a:defRPr sz="4700"/>
-            </a:pPr>
+            <a:pPr lvl="1"/>
             <a:r>
               <a:t>This lecture is designed to help you achieve the following learning objectives</a:t>
             </a:r>
           </a:p>
           <a:p>
-            <a:pPr lvl="2" marL="1415979" indent="-580319" defTabSz="772239">
-              <a:defRPr sz="4700"/>
-            </a:pPr>
+            <a:pPr lvl="2"/>
             <a:r>
               <a:t>Recall and explain the postulates of quantum mechanics</a:t>
             </a:r>
           </a:p>
           <a:p>
-            <a:pPr lvl="2" marL="1415979" indent="-580319" defTabSz="772239">
-              <a:defRPr sz="4700"/>
-            </a:pPr>
+            <a:pPr lvl="2"/>
             <a:r>
               <a:t>Evaluate expectations for given wave functions</a:t>
-            </a:r>
-          </a:p>
-          <a:p>
-            <a:pPr lvl="2" marL="1415979" indent="-580319" defTabSz="772239">
-              <a:defRPr sz="4700"/>
-            </a:pPr>
-            <a:r>
-              <a:t>Express time derivatives of expectation values</a:t>
             </a:r>
           </a:p>
         </p:txBody>
@@ -13799,8 +13763,8 @@
       </p:par>
     </p:tnLst>
     <p:bldLst>
+      <p:bldP build="p" bldLvl="5" animBg="1" rev="0" advAuto="0" spid="275" grpId="1"/>
       <p:bldP build="whole" bldLvl="1" animBg="1" rev="0" advAuto="0" spid="277" grpId="2"/>
-      <p:bldP build="p" bldLvl="5" animBg="1" rev="0" advAuto="0" spid="275" grpId="1"/>
     </p:bldLst>
   </p:timing>
 </p:sld>

</xml_diff>